<commit_message>
slides for week 7 uploaded
</commit_message>
<xml_diff>
--- a/Lectures2025/CITS5503networking_week7.pptx
+++ b/Lectures2025/CITS5503networking_week7.pptx
@@ -2395,6 +2395,10 @@
           <a:bodyPr/>
           <a:lstStyle/>
           <a:p>
+            <a:r>
+              <a:rPr lang="en-AU"/>
+              <a:t>  </a:t>
+            </a:r>
             <a:endParaRPr lang="en-AU" dirty="0"/>
           </a:p>
         </p:txBody>

</xml_diff>